<commit_message>
gestion de la sélection des pleins dans l'historique
</commit_message>
<xml_diff>
--- a/idees_amelioration_appli.pptx
+++ b/idees_amelioration_appli.pptx
@@ -260,7 +260,7 @@
           <a:p>
             <a:fld id="{C3BFE9D2-D5B3-4D16-8A16-A8C0BFA53B22}" type="datetimeFigureOut">
               <a:rPr lang="fr-FR" smtClean="0"/>
-              <a:t>08/05/2025</a:t>
+              <a:t>09/05/2025</a:t>
             </a:fld>
             <a:endParaRPr lang="fr-FR"/>
           </a:p>
@@ -458,7 +458,7 @@
           <a:p>
             <a:fld id="{C3BFE9D2-D5B3-4D16-8A16-A8C0BFA53B22}" type="datetimeFigureOut">
               <a:rPr lang="fr-FR" smtClean="0"/>
-              <a:t>08/05/2025</a:t>
+              <a:t>09/05/2025</a:t>
             </a:fld>
             <a:endParaRPr lang="fr-FR"/>
           </a:p>
@@ -666,7 +666,7 @@
           <a:p>
             <a:fld id="{C3BFE9D2-D5B3-4D16-8A16-A8C0BFA53B22}" type="datetimeFigureOut">
               <a:rPr lang="fr-FR" smtClean="0"/>
-              <a:t>08/05/2025</a:t>
+              <a:t>09/05/2025</a:t>
             </a:fld>
             <a:endParaRPr lang="fr-FR"/>
           </a:p>
@@ -864,7 +864,7 @@
           <a:p>
             <a:fld id="{C3BFE9D2-D5B3-4D16-8A16-A8C0BFA53B22}" type="datetimeFigureOut">
               <a:rPr lang="fr-FR" smtClean="0"/>
-              <a:t>08/05/2025</a:t>
+              <a:t>09/05/2025</a:t>
             </a:fld>
             <a:endParaRPr lang="fr-FR"/>
           </a:p>
@@ -1139,7 +1139,7 @@
           <a:p>
             <a:fld id="{C3BFE9D2-D5B3-4D16-8A16-A8C0BFA53B22}" type="datetimeFigureOut">
               <a:rPr lang="fr-FR" smtClean="0"/>
-              <a:t>08/05/2025</a:t>
+              <a:t>09/05/2025</a:t>
             </a:fld>
             <a:endParaRPr lang="fr-FR"/>
           </a:p>
@@ -1404,7 +1404,7 @@
           <a:p>
             <a:fld id="{C3BFE9D2-D5B3-4D16-8A16-A8C0BFA53B22}" type="datetimeFigureOut">
               <a:rPr lang="fr-FR" smtClean="0"/>
-              <a:t>08/05/2025</a:t>
+              <a:t>09/05/2025</a:t>
             </a:fld>
             <a:endParaRPr lang="fr-FR"/>
           </a:p>
@@ -1816,7 +1816,7 @@
           <a:p>
             <a:fld id="{C3BFE9D2-D5B3-4D16-8A16-A8C0BFA53B22}" type="datetimeFigureOut">
               <a:rPr lang="fr-FR" smtClean="0"/>
-              <a:t>08/05/2025</a:t>
+              <a:t>09/05/2025</a:t>
             </a:fld>
             <a:endParaRPr lang="fr-FR"/>
           </a:p>
@@ -1957,7 +1957,7 @@
           <a:p>
             <a:fld id="{C3BFE9D2-D5B3-4D16-8A16-A8C0BFA53B22}" type="datetimeFigureOut">
               <a:rPr lang="fr-FR" smtClean="0"/>
-              <a:t>08/05/2025</a:t>
+              <a:t>09/05/2025</a:t>
             </a:fld>
             <a:endParaRPr lang="fr-FR"/>
           </a:p>
@@ -2070,7 +2070,7 @@
           <a:p>
             <a:fld id="{C3BFE9D2-D5B3-4D16-8A16-A8C0BFA53B22}" type="datetimeFigureOut">
               <a:rPr lang="fr-FR" smtClean="0"/>
-              <a:t>08/05/2025</a:t>
+              <a:t>09/05/2025</a:t>
             </a:fld>
             <a:endParaRPr lang="fr-FR"/>
           </a:p>
@@ -2381,7 +2381,7 @@
           <a:p>
             <a:fld id="{C3BFE9D2-D5B3-4D16-8A16-A8C0BFA53B22}" type="datetimeFigureOut">
               <a:rPr lang="fr-FR" smtClean="0"/>
-              <a:t>08/05/2025</a:t>
+              <a:t>09/05/2025</a:t>
             </a:fld>
             <a:endParaRPr lang="fr-FR"/>
           </a:p>
@@ -2669,7 +2669,7 @@
           <a:p>
             <a:fld id="{C3BFE9D2-D5B3-4D16-8A16-A8C0BFA53B22}" type="datetimeFigureOut">
               <a:rPr lang="fr-FR" smtClean="0"/>
-              <a:t>08/05/2025</a:t>
+              <a:t>09/05/2025</a:t>
             </a:fld>
             <a:endParaRPr lang="fr-FR"/>
           </a:p>
@@ -2910,7 +2910,7 @@
           <a:p>
             <a:fld id="{C3BFE9D2-D5B3-4D16-8A16-A8C0BFA53B22}" type="datetimeFigureOut">
               <a:rPr lang="fr-FR" smtClean="0"/>
-              <a:t>08/05/2025</a:t>
+              <a:t>09/05/2025</a:t>
             </a:fld>
             <a:endParaRPr lang="fr-FR"/>
           </a:p>
@@ -3467,11 +3467,23 @@
           <a:p>
             <a:r>
               <a:rPr lang="fr-FR" dirty="0"/>
-              <a:t>Sauvegarder les derniers prix de </a:t>
-            </a:r>
-            <a:r>
-              <a:rPr lang="fr-FR"/>
-              <a:t>chaque carburants</a:t>
+              <a:t>Sauvegarder les derniers prix de chaque carburants</a:t>
+            </a:r>
+          </a:p>
+          <a:p>
+            <a:r>
+              <a:rPr lang="fr-FR" dirty="0"/>
+              <a:t>Sauvegarder les données grâce à 2 photos uniquement</a:t>
+            </a:r>
+          </a:p>
+          <a:p>
+            <a:r>
+              <a:rPr lang="fr-FR" dirty="0"/>
+              <a:t>Utiliser de la reconnaissance d’image sur ces </a:t>
+            </a:r>
+            <a:r>
+              <a:rPr lang="fr-FR"/>
+              <a:t>deux photos</a:t>
             </a:r>
             <a:endParaRPr lang="fr-FR" dirty="0"/>
           </a:p>

</xml_diff>